<commit_message>
fixing images - section 1
</commit_message>
<xml_diff>
--- a/images/Image-Bank.pptx
+++ b/images/Image-Bank.pptx
@@ -6,6 +6,7 @@
   </p:sldMasterIdLst>
   <p:sldIdLst>
     <p:sldId id="256" r:id="rId2"/>
+    <p:sldId id="257" r:id="rId3"/>
   </p:sldIdLst>
   <p:sldSz cx="12192000" cy="6858000"/>
   <p:notesSz cx="6858000" cy="9144000"/>
@@ -104,6 +105,11 @@
       </a:defRPr>
     </a:lvl9pPr>
   </p:defaultTextStyle>
+  <p:extLst>
+    <p:ext uri="{EFAFB233-063F-42B5-8137-9DF3F51BA10A}">
+      <p15:sldGuideLst xmlns:p15="http://schemas.microsoft.com/office/powerpoint/2012/main"/>
+    </p:ext>
+  </p:extLst>
 </p:presentation>
 </file>
 
@@ -3335,8 +3341,8 @@
         </p:nvSpPr>
         <p:spPr>
           <a:xfrm>
-            <a:off x="737937" y="1507958"/>
-            <a:ext cx="1909010" cy="850231"/>
+            <a:off x="1045029" y="360292"/>
+            <a:ext cx="2933495" cy="1921042"/>
           </a:xfrm>
           <a:prstGeom prst="rect">
             <a:avLst/>
@@ -3364,12 +3370,50 @@
           <a:p>
             <a:pPr algn="ctr"/>
             <a:r>
+              <a:rPr lang="en-US" dirty="0" err="1">
+                <a:solidFill>
+                  <a:sysClr val="windowText" lastClr="000000"/>
+                </a:solidFill>
+              </a:rPr>
+              <a:t>passengerEntryRate</a:t>
+            </a:r>
+            <a:r>
               <a:rPr lang="en-US" dirty="0">
                 <a:solidFill>
                   <a:sysClr val="windowText" lastClr="000000"/>
                 </a:solidFill>
               </a:rPr>
-              <a:t>Population @ Starting Position</a:t>
+              <a:t>(t)</a:t>
+            </a:r>
+          </a:p>
+          <a:p>
+            <a:pPr algn="ctr"/>
+            <a:r>
+              <a:rPr lang="en-US" dirty="0" err="1">
+                <a:solidFill>
+                  <a:sysClr val="windowText" lastClr="000000"/>
+                </a:solidFill>
+              </a:rPr>
+              <a:t>passengerExitRate</a:t>
+            </a:r>
+            <a:r>
+              <a:rPr lang="en-US" dirty="0">
+                <a:solidFill>
+                  <a:sysClr val="windowText" lastClr="000000"/>
+                </a:solidFill>
+              </a:rPr>
+              <a:t>(t)</a:t>
+            </a:r>
+          </a:p>
+          <a:p>
+            <a:pPr algn="ctr"/>
+            <a:r>
+              <a:rPr lang="en-US" dirty="0">
+                <a:solidFill>
+                  <a:sysClr val="windowText" lastClr="000000"/>
+                </a:solidFill>
+              </a:rPr>
+              <a:t>[note these rates necessarily limited by acceptable walking pack density and available space]</a:t>
             </a:r>
           </a:p>
         </p:txBody>
@@ -3388,8 +3432,8 @@
         </p:nvSpPr>
         <p:spPr>
           <a:xfrm>
-            <a:off x="3569368" y="1507957"/>
-            <a:ext cx="1909010" cy="850231"/>
+            <a:off x="4423691" y="360291"/>
+            <a:ext cx="3344617" cy="1921043"/>
           </a:xfrm>
           <a:prstGeom prst="rect">
             <a:avLst/>
@@ -3417,13 +3461,98 @@
           <a:p>
             <a:pPr algn="ctr"/>
             <a:r>
-              <a:rPr lang="en-US" dirty="0">
+              <a:rPr lang="en-US" dirty="0" err="1">
                 <a:solidFill>
                   <a:sysClr val="windowText" lastClr="000000"/>
                 </a:solidFill>
               </a:rPr>
-              <a:t>Subway System</a:t>
-            </a:r>
+              <a:t>escalatorWidth</a:t>
+            </a:r>
+            <a:endParaRPr lang="en-US" dirty="0">
+              <a:solidFill>
+                <a:sysClr val="windowText" lastClr="000000"/>
+              </a:solidFill>
+            </a:endParaRPr>
+          </a:p>
+          <a:p>
+            <a:pPr algn="ctr"/>
+            <a:r>
+              <a:rPr lang="en-US" dirty="0" err="1">
+                <a:solidFill>
+                  <a:sysClr val="windowText" lastClr="000000"/>
+                </a:solidFill>
+              </a:rPr>
+              <a:t>escalatorPassiveTanslateRate</a:t>
+            </a:r>
+            <a:endParaRPr lang="en-US" dirty="0">
+              <a:solidFill>
+                <a:sysClr val="windowText" lastClr="000000"/>
+              </a:solidFill>
+            </a:endParaRPr>
+          </a:p>
+          <a:p>
+            <a:pPr algn="ctr"/>
+            <a:r>
+              <a:rPr lang="en-US" dirty="0" err="1">
+                <a:solidFill>
+                  <a:sysClr val="windowText" lastClr="000000"/>
+                </a:solidFill>
+              </a:rPr>
+              <a:t>escalatorEntryNumber</a:t>
+            </a:r>
+            <a:endParaRPr lang="en-US" dirty="0">
+              <a:solidFill>
+                <a:sysClr val="windowText" lastClr="000000"/>
+              </a:solidFill>
+            </a:endParaRPr>
+          </a:p>
+          <a:p>
+            <a:pPr algn="ctr"/>
+            <a:r>
+              <a:rPr lang="en-US" dirty="0" err="1">
+                <a:solidFill>
+                  <a:sysClr val="windowText" lastClr="000000"/>
+                </a:solidFill>
+              </a:rPr>
+              <a:t>escalatorExitNumber</a:t>
+            </a:r>
+            <a:endParaRPr lang="en-US" dirty="0">
+              <a:solidFill>
+                <a:sysClr val="windowText" lastClr="000000"/>
+              </a:solidFill>
+            </a:endParaRPr>
+          </a:p>
+          <a:p>
+            <a:pPr algn="ctr"/>
+            <a:r>
+              <a:rPr lang="en-US" dirty="0" err="1">
+                <a:solidFill>
+                  <a:sysClr val="windowText" lastClr="000000"/>
+                </a:solidFill>
+              </a:rPr>
+              <a:t>escalatorAllowsActiveTranslate</a:t>
+            </a:r>
+            <a:endParaRPr lang="en-US" dirty="0">
+              <a:solidFill>
+                <a:sysClr val="windowText" lastClr="000000"/>
+              </a:solidFill>
+            </a:endParaRPr>
+          </a:p>
+          <a:p>
+            <a:pPr algn="ctr"/>
+            <a:r>
+              <a:rPr lang="en-US" dirty="0" err="1">
+                <a:solidFill>
+                  <a:sysClr val="windowText" lastClr="000000"/>
+                </a:solidFill>
+              </a:rPr>
+              <a:t>escalatorAcceptablePackDensity</a:t>
+            </a:r>
+            <a:endParaRPr lang="en-US" dirty="0">
+              <a:solidFill>
+                <a:sysClr val="windowText" lastClr="000000"/>
+              </a:solidFill>
+            </a:endParaRPr>
           </a:p>
         </p:txBody>
       </p:sp>
@@ -3441,8 +3570,8 @@
         </p:nvSpPr>
         <p:spPr>
           <a:xfrm>
-            <a:off x="6400799" y="1507956"/>
-            <a:ext cx="1909010" cy="850231"/>
+            <a:off x="8076391" y="360292"/>
+            <a:ext cx="2887134" cy="1921042"/>
           </a:xfrm>
           <a:prstGeom prst="rect">
             <a:avLst/>
@@ -3470,12 +3599,58 @@
           <a:p>
             <a:pPr algn="ctr"/>
             <a:r>
+              <a:rPr lang="en-US" dirty="0" err="1">
+                <a:solidFill>
+                  <a:sysClr val="windowText" lastClr="000000"/>
+                </a:solidFill>
+              </a:rPr>
+              <a:t>passengersTranslated</a:t>
+            </a:r>
+            <a:r>
               <a:rPr lang="en-US" dirty="0">
                 <a:solidFill>
                   <a:sysClr val="windowText" lastClr="000000"/>
                 </a:solidFill>
               </a:rPr>
-              <a:t>Population @ Final Position</a:t>
+              <a:t>(t)</a:t>
+            </a:r>
+          </a:p>
+          <a:p>
+            <a:pPr algn="ctr"/>
+            <a:r>
+              <a:rPr lang="en-US" dirty="0" err="1">
+                <a:solidFill>
+                  <a:sysClr val="windowText" lastClr="000000"/>
+                </a:solidFill>
+              </a:rPr>
+              <a:t>passengerAvgComfort</a:t>
+            </a:r>
+            <a:r>
+              <a:rPr lang="en-US" dirty="0">
+                <a:solidFill>
+                  <a:sysClr val="windowText" lastClr="000000"/>
+                </a:solidFill>
+              </a:rPr>
+              <a:t>(t)</a:t>
+            </a:r>
+          </a:p>
+          <a:p>
+            <a:pPr algn="ctr"/>
+            <a:r>
+              <a:rPr lang="en-US" dirty="0" err="1">
+                <a:solidFill>
+                  <a:sysClr val="windowText" lastClr="000000"/>
+                </a:solidFill>
+              </a:rPr>
+              <a:t>passengerTransitRate</a:t>
+            </a:r>
+            <a:r>
+              <a:rPr lang="en-US" dirty="0">
+                <a:solidFill>
+                  <a:sysClr val="windowText" lastClr="000000"/>
+                </a:solidFill>
+              </a:rPr>
+              <a:t>(t)</a:t>
             </a:r>
           </a:p>
         </p:txBody>
@@ -3497,9 +3672,9 @@
           <p:nvPr/>
         </p:nvCxnSpPr>
         <p:spPr>
-          <a:xfrm flipV="1">
-            <a:off x="2646947" y="1933073"/>
-            <a:ext cx="922421" cy="1"/>
+          <a:xfrm>
+            <a:off x="3978524" y="1320813"/>
+            <a:ext cx="445167" cy="0"/>
           </a:xfrm>
           <a:prstGeom prst="straightConnector1">
             <a:avLst/>
@@ -3533,15 +3708,16 @@
             </a:extLst>
           </p:cNvPr>
           <p:cNvCxnSpPr>
+            <a:cxnSpLocks/>
             <a:stCxn id="5" idx="3"/>
             <a:endCxn id="6" idx="1"/>
           </p:cNvCxnSpPr>
           <p:nvPr/>
         </p:nvCxnSpPr>
         <p:spPr>
-          <a:xfrm flipV="1">
-            <a:off x="5478378" y="1933072"/>
-            <a:ext cx="922421" cy="1"/>
+          <a:xfrm>
+            <a:off x="7768308" y="1320813"/>
+            <a:ext cx="308083" cy="0"/>
           </a:xfrm>
           <a:prstGeom prst="straightConnector1">
             <a:avLst/>
@@ -3565,10 +3741,411 @@
           </a:fontRef>
         </p:style>
       </p:cxnSp>
+      <p:pic>
+        <p:nvPicPr>
+          <p:cNvPr id="34" name="Picture 33">
+            <a:extLst>
+              <a:ext uri="{FF2B5EF4-FFF2-40B4-BE49-F238E27FC236}">
+                <a16:creationId xmlns:a16="http://schemas.microsoft.com/office/drawing/2014/main" id="{FC39C7DD-B7B5-4E8F-ACA2-FB06737BEB6D}"/>
+              </a:ext>
+            </a:extLst>
+          </p:cNvPr>
+          <p:cNvPicPr>
+            <a:picLocks noChangeAspect="1"/>
+          </p:cNvPicPr>
+          <p:nvPr/>
+        </p:nvPicPr>
+        <p:blipFill>
+          <a:blip r:embed="rId2"/>
+          <a:stretch>
+            <a:fillRect/>
+          </a:stretch>
+        </p:blipFill>
+        <p:spPr>
+          <a:xfrm>
+            <a:off x="5329657" y="2397967"/>
+            <a:ext cx="1532686" cy="1387345"/>
+          </a:xfrm>
+          <a:prstGeom prst="rect">
+            <a:avLst/>
+          </a:prstGeom>
+        </p:spPr>
+      </p:pic>
+      <p:pic>
+        <p:nvPicPr>
+          <p:cNvPr id="35" name="Picture 34">
+            <a:extLst>
+              <a:ext uri="{FF2B5EF4-FFF2-40B4-BE49-F238E27FC236}">
+                <a16:creationId xmlns:a16="http://schemas.microsoft.com/office/drawing/2014/main" id="{8E339406-BB8A-4BA5-BE90-EB6F0BAD08D5}"/>
+              </a:ext>
+            </a:extLst>
+          </p:cNvPr>
+          <p:cNvPicPr>
+            <a:picLocks noChangeAspect="1"/>
+          </p:cNvPicPr>
+          <p:nvPr/>
+        </p:nvPicPr>
+        <p:blipFill>
+          <a:blip r:embed="rId3"/>
+          <a:stretch>
+            <a:fillRect/>
+          </a:stretch>
+        </p:blipFill>
+        <p:spPr>
+          <a:xfrm>
+            <a:off x="5329657" y="3901945"/>
+            <a:ext cx="1526080" cy="1354313"/>
+          </a:xfrm>
+          <a:prstGeom prst="rect">
+            <a:avLst/>
+          </a:prstGeom>
+        </p:spPr>
+      </p:pic>
+      <p:pic>
+        <p:nvPicPr>
+          <p:cNvPr id="37" name="Picture 36">
+            <a:extLst>
+              <a:ext uri="{FF2B5EF4-FFF2-40B4-BE49-F238E27FC236}">
+                <a16:creationId xmlns:a16="http://schemas.microsoft.com/office/drawing/2014/main" id="{6D65BD29-CF5F-4C13-B10F-6EF42F7B36D3}"/>
+              </a:ext>
+            </a:extLst>
+          </p:cNvPr>
+          <p:cNvPicPr>
+            <a:picLocks noChangeAspect="1"/>
+          </p:cNvPicPr>
+          <p:nvPr/>
+        </p:nvPicPr>
+        <p:blipFill>
+          <a:blip r:embed="rId4"/>
+          <a:stretch>
+            <a:fillRect/>
+          </a:stretch>
+        </p:blipFill>
+        <p:spPr>
+          <a:xfrm>
+            <a:off x="2076833" y="4289770"/>
+            <a:ext cx="869885" cy="961824"/>
+          </a:xfrm>
+          <a:prstGeom prst="rect">
+            <a:avLst/>
+          </a:prstGeom>
+        </p:spPr>
+      </p:pic>
+      <p:pic>
+        <p:nvPicPr>
+          <p:cNvPr id="38" name="Picture 37">
+            <a:extLst>
+              <a:ext uri="{FF2B5EF4-FFF2-40B4-BE49-F238E27FC236}">
+                <a16:creationId xmlns:a16="http://schemas.microsoft.com/office/drawing/2014/main" id="{3436D92E-C438-48E4-9A42-6EA01442A168}"/>
+              </a:ext>
+            </a:extLst>
+          </p:cNvPr>
+          <p:cNvPicPr>
+            <a:picLocks noChangeAspect="1"/>
+          </p:cNvPicPr>
+          <p:nvPr/>
+        </p:nvPicPr>
+        <p:blipFill>
+          <a:blip r:embed="rId4"/>
+          <a:stretch>
+            <a:fillRect/>
+          </a:stretch>
+        </p:blipFill>
+        <p:spPr>
+          <a:xfrm flipH="1">
+            <a:off x="2076833" y="2689570"/>
+            <a:ext cx="869885" cy="961824"/>
+          </a:xfrm>
+          <a:prstGeom prst="rect">
+            <a:avLst/>
+          </a:prstGeom>
+        </p:spPr>
+      </p:pic>
+      <p:sp>
+        <p:nvSpPr>
+          <p:cNvPr id="39" name="Rectangle: Rounded Corners 38">
+            <a:extLst>
+              <a:ext uri="{FF2B5EF4-FFF2-40B4-BE49-F238E27FC236}">
+                <a16:creationId xmlns:a16="http://schemas.microsoft.com/office/drawing/2014/main" id="{07656906-B900-4108-81C1-2B79C03966FF}"/>
+              </a:ext>
+            </a:extLst>
+          </p:cNvPr>
+          <p:cNvSpPr/>
+          <p:nvPr/>
+        </p:nvSpPr>
+        <p:spPr>
+          <a:xfrm>
+            <a:off x="1117600" y="2514600"/>
+            <a:ext cx="2734733" cy="1270712"/>
+          </a:xfrm>
+          <a:prstGeom prst="roundRect">
+            <a:avLst/>
+          </a:prstGeom>
+          <a:noFill/>
+          <a:ln w="38100"/>
+        </p:spPr>
+        <p:style>
+          <a:lnRef idx="2">
+            <a:schemeClr val="dk1">
+              <a:shade val="50000"/>
+            </a:schemeClr>
+          </a:lnRef>
+          <a:fillRef idx="1">
+            <a:schemeClr val="dk1"/>
+          </a:fillRef>
+          <a:effectRef idx="0">
+            <a:schemeClr val="dk1"/>
+          </a:effectRef>
+          <a:fontRef idx="minor">
+            <a:schemeClr val="lt1"/>
+          </a:fontRef>
+        </p:style>
+        <p:txBody>
+          <a:bodyPr rtlCol="0" anchor="ctr"/>
+          <a:lstStyle/>
+          <a:p>
+            <a:pPr algn="ctr"/>
+            <a:endParaRPr lang="en-US"/>
+          </a:p>
+        </p:txBody>
+      </p:sp>
+      <p:sp>
+        <p:nvSpPr>
+          <p:cNvPr id="40" name="Rectangle: Rounded Corners 39">
+            <a:extLst>
+              <a:ext uri="{FF2B5EF4-FFF2-40B4-BE49-F238E27FC236}">
+                <a16:creationId xmlns:a16="http://schemas.microsoft.com/office/drawing/2014/main" id="{B3E836D8-2A18-4208-B9C8-0879F13DE421}"/>
+              </a:ext>
+            </a:extLst>
+          </p:cNvPr>
+          <p:cNvSpPr/>
+          <p:nvPr/>
+        </p:nvSpPr>
+        <p:spPr>
+          <a:xfrm>
+            <a:off x="1144408" y="4135326"/>
+            <a:ext cx="2734733" cy="1270712"/>
+          </a:xfrm>
+          <a:prstGeom prst="roundRect">
+            <a:avLst/>
+          </a:prstGeom>
+          <a:noFill/>
+          <a:ln w="38100"/>
+        </p:spPr>
+        <p:style>
+          <a:lnRef idx="2">
+            <a:schemeClr val="dk1">
+              <a:shade val="50000"/>
+            </a:schemeClr>
+          </a:lnRef>
+          <a:fillRef idx="1">
+            <a:schemeClr val="dk1"/>
+          </a:fillRef>
+          <a:effectRef idx="0">
+            <a:schemeClr val="dk1"/>
+          </a:effectRef>
+          <a:fontRef idx="minor">
+            <a:schemeClr val="lt1"/>
+          </a:fontRef>
+        </p:style>
+        <p:txBody>
+          <a:bodyPr rtlCol="0" anchor="ctr"/>
+          <a:lstStyle/>
+          <a:p>
+            <a:pPr algn="ctr"/>
+            <a:endParaRPr lang="en-US"/>
+          </a:p>
+        </p:txBody>
+      </p:sp>
+      <p:pic>
+        <p:nvPicPr>
+          <p:cNvPr id="41" name="Picture 40">
+            <a:extLst>
+              <a:ext uri="{FF2B5EF4-FFF2-40B4-BE49-F238E27FC236}">
+                <a16:creationId xmlns:a16="http://schemas.microsoft.com/office/drawing/2014/main" id="{AF955712-E247-4E85-964C-B9F88DAF6CE2}"/>
+              </a:ext>
+            </a:extLst>
+          </p:cNvPr>
+          <p:cNvPicPr>
+            <a:picLocks noChangeAspect="1"/>
+          </p:cNvPicPr>
+          <p:nvPr/>
+        </p:nvPicPr>
+        <p:blipFill>
+          <a:blip r:embed="rId5"/>
+          <a:stretch>
+            <a:fillRect/>
+          </a:stretch>
+        </p:blipFill>
+        <p:spPr>
+          <a:xfrm>
+            <a:off x="8708496" y="2887673"/>
+            <a:ext cx="1595008" cy="1795278"/>
+          </a:xfrm>
+          <a:prstGeom prst="rect">
+            <a:avLst/>
+          </a:prstGeom>
+        </p:spPr>
+      </p:pic>
+      <p:pic>
+        <p:nvPicPr>
+          <p:cNvPr id="42" name="Picture 41">
+            <a:extLst>
+              <a:ext uri="{FF2B5EF4-FFF2-40B4-BE49-F238E27FC236}">
+                <a16:creationId xmlns:a16="http://schemas.microsoft.com/office/drawing/2014/main" id="{1FB243C1-B731-40EB-A94B-56F93702C527}"/>
+              </a:ext>
+            </a:extLst>
+          </p:cNvPr>
+          <p:cNvPicPr>
+            <a:picLocks noChangeAspect="1"/>
+          </p:cNvPicPr>
+          <p:nvPr/>
+        </p:nvPicPr>
+        <p:blipFill>
+          <a:blip r:embed="rId6"/>
+          <a:stretch>
+            <a:fillRect/>
+          </a:stretch>
+        </p:blipFill>
+        <p:spPr>
+          <a:xfrm>
+            <a:off x="9840871" y="4983038"/>
+            <a:ext cx="1039250" cy="306252"/>
+          </a:xfrm>
+          <a:prstGeom prst="rect">
+            <a:avLst/>
+          </a:prstGeom>
+        </p:spPr>
+      </p:pic>
+      <p:sp>
+        <p:nvSpPr>
+          <p:cNvPr id="43" name="TextBox 42">
+            <a:extLst>
+              <a:ext uri="{FF2B5EF4-FFF2-40B4-BE49-F238E27FC236}">
+                <a16:creationId xmlns:a16="http://schemas.microsoft.com/office/drawing/2014/main" id="{8FDACB86-81CC-4672-8027-D4FE26A20785}"/>
+              </a:ext>
+            </a:extLst>
+          </p:cNvPr>
+          <p:cNvSpPr txBox="1"/>
+          <p:nvPr/>
+        </p:nvSpPr>
+        <p:spPr>
+          <a:xfrm>
+            <a:off x="9137481" y="5023165"/>
+            <a:ext cx="764953" cy="215444"/>
+          </a:xfrm>
+          <a:prstGeom prst="rect">
+            <a:avLst/>
+          </a:prstGeom>
+          <a:noFill/>
+        </p:spPr>
+        <p:txBody>
+          <a:bodyPr wrap="none" rtlCol="0">
+            <a:spAutoFit/>
+          </a:bodyPr>
+          <a:lstStyle/>
+          <a:p>
+            <a:r>
+              <a:rPr lang="en-US" sz="800" dirty="0"/>
+              <a:t>Icon credit to:</a:t>
+            </a:r>
+          </a:p>
+        </p:txBody>
+      </p:sp>
     </p:spTree>
     <p:extLst>
       <p:ext uri="{BB962C8B-B14F-4D97-AF65-F5344CB8AC3E}">
         <p14:creationId xmlns:p14="http://schemas.microsoft.com/office/powerpoint/2010/main" val="2923303638"/>
+      </p:ext>
+    </p:extLst>
+  </p:cSld>
+  <p:clrMapOvr>
+    <a:masterClrMapping/>
+  </p:clrMapOvr>
+</p:sld>
+</file>
+
+<file path=ppt/slides/slide2.xml><?xml version="1.0" encoding="utf-8"?>
+<p:sld xmlns:a="http://schemas.openxmlformats.org/drawingml/2006/main" xmlns:r="http://schemas.openxmlformats.org/officeDocument/2006/relationships" xmlns:p="http://schemas.openxmlformats.org/presentationml/2006/main">
+  <p:cSld>
+    <p:spTree>
+      <p:nvGrpSpPr>
+        <p:cNvPr id="1" name=""/>
+        <p:cNvGrpSpPr/>
+        <p:nvPr/>
+      </p:nvGrpSpPr>
+      <p:grpSpPr>
+        <a:xfrm>
+          <a:off x="0" y="0"/>
+          <a:ext cx="0" cy="0"/>
+          <a:chOff x="0" y="0"/>
+          <a:chExt cx="0" cy="0"/>
+        </a:xfrm>
+      </p:grpSpPr>
+      <p:pic>
+        <p:nvPicPr>
+          <p:cNvPr id="4" name="Picture 3">
+            <a:extLst>
+              <a:ext uri="{FF2B5EF4-FFF2-40B4-BE49-F238E27FC236}">
+                <a16:creationId xmlns:a16="http://schemas.microsoft.com/office/drawing/2014/main" id="{9C92945C-F9EB-4751-BAA6-5C0EE4CD9FA8}"/>
+              </a:ext>
+            </a:extLst>
+          </p:cNvPr>
+          <p:cNvPicPr>
+            <a:picLocks noChangeAspect="1"/>
+          </p:cNvPicPr>
+          <p:nvPr/>
+        </p:nvPicPr>
+        <p:blipFill>
+          <a:blip r:embed="rId2"/>
+          <a:stretch>
+            <a:fillRect/>
+          </a:stretch>
+        </p:blipFill>
+        <p:spPr>
+          <a:xfrm>
+            <a:off x="3227614" y="1251468"/>
+            <a:ext cx="2209800" cy="2000250"/>
+          </a:xfrm>
+          <a:prstGeom prst="rect">
+            <a:avLst/>
+          </a:prstGeom>
+        </p:spPr>
+      </p:pic>
+      <p:pic>
+        <p:nvPicPr>
+          <p:cNvPr id="5" name="Picture 4">
+            <a:extLst>
+              <a:ext uri="{FF2B5EF4-FFF2-40B4-BE49-F238E27FC236}">
+                <a16:creationId xmlns:a16="http://schemas.microsoft.com/office/drawing/2014/main" id="{B00E8CB9-E031-4AFF-ADFE-D6ECC3A2B1E7}"/>
+              </a:ext>
+            </a:extLst>
+          </p:cNvPr>
+          <p:cNvPicPr>
+            <a:picLocks noChangeAspect="1"/>
+          </p:cNvPicPr>
+          <p:nvPr/>
+        </p:nvPicPr>
+        <p:blipFill>
+          <a:blip r:embed="rId3"/>
+          <a:stretch>
+            <a:fillRect/>
+          </a:stretch>
+        </p:blipFill>
+        <p:spPr>
+          <a:xfrm>
+            <a:off x="3227614" y="3542266"/>
+            <a:ext cx="2200275" cy="1952625"/>
+          </a:xfrm>
+          <a:prstGeom prst="rect">
+            <a:avLst/>
+          </a:prstGeom>
+        </p:spPr>
+      </p:pic>
+    </p:spTree>
+    <p:extLst>
+      <p:ext uri="{BB962C8B-B14F-4D97-AF65-F5344CB8AC3E}">
+        <p14:creationId xmlns:p14="http://schemas.microsoft.com/office/powerpoint/2010/main" val="3116251049"/>
       </p:ext>
     </p:extLst>
   </p:cSld>

</xml_diff>

<commit_message>
adding to part 1
</commit_message>
<xml_diff>
--- a/images/Image-Bank.pptx
+++ b/images/Image-Bank.pptx
@@ -278,7 +278,7 @@
           <a:p>
             <a:fld id="{F91AC8E1-66F4-4D62-98DF-EBF70E550C22}" type="datetimeFigureOut">
               <a:rPr lang="en-US" smtClean="0"/>
-              <a:t>9/5/2019</a:t>
+              <a:t>9/7/2019</a:t>
             </a:fld>
             <a:endParaRPr lang="en-US" dirty="0"/>
           </a:p>
@@ -476,7 +476,7 @@
           <a:p>
             <a:fld id="{F91AC8E1-66F4-4D62-98DF-EBF70E550C22}" type="datetimeFigureOut">
               <a:rPr lang="en-US" smtClean="0"/>
-              <a:t>9/5/2019</a:t>
+              <a:t>9/7/2019</a:t>
             </a:fld>
             <a:endParaRPr lang="en-US" dirty="0"/>
           </a:p>
@@ -684,7 +684,7 @@
           <a:p>
             <a:fld id="{F91AC8E1-66F4-4D62-98DF-EBF70E550C22}" type="datetimeFigureOut">
               <a:rPr lang="en-US" smtClean="0"/>
-              <a:t>9/5/2019</a:t>
+              <a:t>9/7/2019</a:t>
             </a:fld>
             <a:endParaRPr lang="en-US" dirty="0"/>
           </a:p>
@@ -882,7 +882,7 @@
           <a:p>
             <a:fld id="{F91AC8E1-66F4-4D62-98DF-EBF70E550C22}" type="datetimeFigureOut">
               <a:rPr lang="en-US" smtClean="0"/>
-              <a:t>9/5/2019</a:t>
+              <a:t>9/7/2019</a:t>
             </a:fld>
             <a:endParaRPr lang="en-US" dirty="0"/>
           </a:p>
@@ -1157,7 +1157,7 @@
           <a:p>
             <a:fld id="{F91AC8E1-66F4-4D62-98DF-EBF70E550C22}" type="datetimeFigureOut">
               <a:rPr lang="en-US" smtClean="0"/>
-              <a:t>9/5/2019</a:t>
+              <a:t>9/7/2019</a:t>
             </a:fld>
             <a:endParaRPr lang="en-US" dirty="0"/>
           </a:p>
@@ -1422,7 +1422,7 @@
           <a:p>
             <a:fld id="{F91AC8E1-66F4-4D62-98DF-EBF70E550C22}" type="datetimeFigureOut">
               <a:rPr lang="en-US" smtClean="0"/>
-              <a:t>9/5/2019</a:t>
+              <a:t>9/7/2019</a:t>
             </a:fld>
             <a:endParaRPr lang="en-US" dirty="0"/>
           </a:p>
@@ -1834,7 +1834,7 @@
           <a:p>
             <a:fld id="{F91AC8E1-66F4-4D62-98DF-EBF70E550C22}" type="datetimeFigureOut">
               <a:rPr lang="en-US" smtClean="0"/>
-              <a:t>9/5/2019</a:t>
+              <a:t>9/7/2019</a:t>
             </a:fld>
             <a:endParaRPr lang="en-US" dirty="0"/>
           </a:p>
@@ -1975,7 +1975,7 @@
           <a:p>
             <a:fld id="{F91AC8E1-66F4-4D62-98DF-EBF70E550C22}" type="datetimeFigureOut">
               <a:rPr lang="en-US" smtClean="0"/>
-              <a:t>9/5/2019</a:t>
+              <a:t>9/7/2019</a:t>
             </a:fld>
             <a:endParaRPr lang="en-US" dirty="0"/>
           </a:p>
@@ -2088,7 +2088,7 @@
           <a:p>
             <a:fld id="{F91AC8E1-66F4-4D62-98DF-EBF70E550C22}" type="datetimeFigureOut">
               <a:rPr lang="en-US" smtClean="0"/>
-              <a:t>9/5/2019</a:t>
+              <a:t>9/7/2019</a:t>
             </a:fld>
             <a:endParaRPr lang="en-US" dirty="0"/>
           </a:p>
@@ -2399,7 +2399,7 @@
           <a:p>
             <a:fld id="{F91AC8E1-66F4-4D62-98DF-EBF70E550C22}" type="datetimeFigureOut">
               <a:rPr lang="en-US" smtClean="0"/>
-              <a:t>9/5/2019</a:t>
+              <a:t>9/7/2019</a:t>
             </a:fld>
             <a:endParaRPr lang="en-US" dirty="0"/>
           </a:p>
@@ -2687,7 +2687,7 @@
           <a:p>
             <a:fld id="{F91AC8E1-66F4-4D62-98DF-EBF70E550C22}" type="datetimeFigureOut">
               <a:rPr lang="en-US" smtClean="0"/>
-              <a:t>9/5/2019</a:t>
+              <a:t>9/7/2019</a:t>
             </a:fld>
             <a:endParaRPr lang="en-US" dirty="0"/>
           </a:p>
@@ -2928,7 +2928,7 @@
           <a:p>
             <a:fld id="{F91AC8E1-66F4-4D62-98DF-EBF70E550C22}" type="datetimeFigureOut">
               <a:rPr lang="en-US" smtClean="0"/>
-              <a:t>9/5/2019</a:t>
+              <a:t>9/7/2019</a:t>
             </a:fld>
             <a:endParaRPr lang="en-US" dirty="0"/>
           </a:p>
@@ -8389,7 +8389,7 @@
         <p:spPr>
           <a:xfrm>
             <a:off x="437091" y="307367"/>
-            <a:ext cx="10078509" cy="2571300"/>
+            <a:ext cx="7792509" cy="4984300"/>
           </a:xfrm>
           <a:prstGeom prst="rect">
             <a:avLst/>
@@ -8503,7 +8503,7 @@
         </p:nvSpPr>
         <p:spPr>
           <a:xfrm>
-            <a:off x="657830" y="1932967"/>
+            <a:off x="657830" y="3179041"/>
             <a:ext cx="1254278" cy="270935"/>
           </a:xfrm>
           <a:prstGeom prst="rect">
@@ -8602,7 +8602,7 @@
                   <a:schemeClr val="tx1"/>
                 </a:solidFill>
               </a:rPr>
-              <a:t>spawnPassenger()</a:t>
+              <a:t>spawnPassenger() @ entry rate</a:t>
             </a:r>
           </a:p>
         </p:txBody>
@@ -8621,7 +8621,7 @@
         </p:nvSpPr>
         <p:spPr>
           <a:xfrm>
-            <a:off x="657830" y="2203902"/>
+            <a:off x="657830" y="3449976"/>
             <a:ext cx="1254278" cy="429232"/>
           </a:xfrm>
           <a:prstGeom prst="rect">
@@ -8661,7 +8661,7 @@
                   <a:schemeClr val="tx1"/>
                 </a:solidFill>
               </a:rPr>
-              <a:t>spawnPassenger()</a:t>
+              <a:t>spawnPassenger() @ exit rate</a:t>
             </a:r>
           </a:p>
         </p:txBody>
@@ -8786,10 +8786,10 @@
       </p:sp>
       <p:sp>
         <p:nvSpPr>
-          <p:cNvPr id="12" name="Rectangle 11">
-            <a:extLst>
-              <a:ext uri="{FF2B5EF4-FFF2-40B4-BE49-F238E27FC236}">
-                <a16:creationId xmlns:a16="http://schemas.microsoft.com/office/drawing/2014/main" id="{FCF45D9D-C8C7-49E4-9660-0A927A9D9E42}"/>
+          <p:cNvPr id="13" name="Rectangle 12">
+            <a:extLst>
+              <a:ext uri="{FF2B5EF4-FFF2-40B4-BE49-F238E27FC236}">
+                <a16:creationId xmlns:a16="http://schemas.microsoft.com/office/drawing/2014/main" id="{91602CE5-D8A3-4684-818F-178499F25C7B}"/>
               </a:ext>
             </a:extLst>
           </p:cNvPr>
@@ -8798,7 +8798,7 @@
         </p:nvSpPr>
         <p:spPr>
           <a:xfrm>
-            <a:off x="5047073" y="1134338"/>
+            <a:off x="3581991" y="2076891"/>
             <a:ext cx="1254278" cy="350085"/>
           </a:xfrm>
           <a:prstGeom prst="rect">
@@ -8838,17 +8838,17 @@
                   <a:schemeClr val="tx1"/>
                 </a:solidFill>
               </a:rPr>
-              <a:t>Board escalator</a:t>
-            </a:r>
-          </a:p>
-        </p:txBody>
-      </p:sp>
-      <p:sp>
-        <p:nvSpPr>
-          <p:cNvPr id="13" name="Rectangle 12">
-            <a:extLst>
-              <a:ext uri="{FF2B5EF4-FFF2-40B4-BE49-F238E27FC236}">
-                <a16:creationId xmlns:a16="http://schemas.microsoft.com/office/drawing/2014/main" id="{91602CE5-D8A3-4684-818F-178499F25C7B}"/>
+              <a:t>Ride escalator</a:t>
+            </a:r>
+          </a:p>
+        </p:txBody>
+      </p:sp>
+      <p:sp>
+        <p:nvSpPr>
+          <p:cNvPr id="14" name="Rectangle 13">
+            <a:extLst>
+              <a:ext uri="{FF2B5EF4-FFF2-40B4-BE49-F238E27FC236}">
+                <a16:creationId xmlns:a16="http://schemas.microsoft.com/office/drawing/2014/main" id="{5D2E12E4-66FB-49DC-AAD0-E8F30367FA3F}"/>
               </a:ext>
             </a:extLst>
           </p:cNvPr>
@@ -8857,7 +8857,7 @@
         </p:nvSpPr>
         <p:spPr>
           <a:xfrm>
-            <a:off x="6495863" y="1134338"/>
+            <a:off x="5030781" y="2076891"/>
             <a:ext cx="1254278" cy="350085"/>
           </a:xfrm>
           <a:prstGeom prst="rect">
@@ -8897,17 +8897,17 @@
                   <a:schemeClr val="tx1"/>
                 </a:solidFill>
               </a:rPr>
-              <a:t>Ride escalator</a:t>
-            </a:r>
-          </a:p>
-        </p:txBody>
-      </p:sp>
-      <p:sp>
-        <p:nvSpPr>
-          <p:cNvPr id="14" name="Rectangle 13">
-            <a:extLst>
-              <a:ext uri="{FF2B5EF4-FFF2-40B4-BE49-F238E27FC236}">
-                <a16:creationId xmlns:a16="http://schemas.microsoft.com/office/drawing/2014/main" id="{5D2E12E4-66FB-49DC-AAD0-E8F30367FA3F}"/>
+              <a:t>Offboard Escalator</a:t>
+            </a:r>
+          </a:p>
+        </p:txBody>
+      </p:sp>
+      <p:sp>
+        <p:nvSpPr>
+          <p:cNvPr id="15" name="Rectangle 14">
+            <a:extLst>
+              <a:ext uri="{FF2B5EF4-FFF2-40B4-BE49-F238E27FC236}">
+                <a16:creationId xmlns:a16="http://schemas.microsoft.com/office/drawing/2014/main" id="{309D0175-6A4F-4B91-AD4A-62445CEEF503}"/>
               </a:ext>
             </a:extLst>
           </p:cNvPr>
@@ -8916,8 +8916,8 @@
         </p:nvSpPr>
         <p:spPr>
           <a:xfrm>
-            <a:off x="7944653" y="1134338"/>
-            <a:ext cx="1254278" cy="350085"/>
+            <a:off x="6522444" y="2070993"/>
+            <a:ext cx="946302" cy="350085"/>
           </a:xfrm>
           <a:prstGeom prst="rect">
             <a:avLst/>
@@ -8956,17 +8956,17 @@
                   <a:schemeClr val="tx1"/>
                 </a:solidFill>
               </a:rPr>
-              <a:t>Offboard Escalator</a:t>
-            </a:r>
-          </a:p>
-        </p:txBody>
-      </p:sp>
-      <p:sp>
-        <p:nvSpPr>
-          <p:cNvPr id="15" name="Rectangle 14">
-            <a:extLst>
-              <a:ext uri="{FF2B5EF4-FFF2-40B4-BE49-F238E27FC236}">
-                <a16:creationId xmlns:a16="http://schemas.microsoft.com/office/drawing/2014/main" id="{309D0175-6A4F-4B91-AD4A-62445CEEF503}"/>
+              <a:t>Exit</a:t>
+            </a:r>
+          </a:p>
+        </p:txBody>
+      </p:sp>
+      <p:sp>
+        <p:nvSpPr>
+          <p:cNvPr id="16" name="Rectangle 15">
+            <a:extLst>
+              <a:ext uri="{FF2B5EF4-FFF2-40B4-BE49-F238E27FC236}">
+                <a16:creationId xmlns:a16="http://schemas.microsoft.com/office/drawing/2014/main" id="{AA72283E-101D-44F1-97FA-38DEB1489EC0}"/>
               </a:ext>
             </a:extLst>
           </p:cNvPr>
@@ -8975,8 +8975,8 @@
         </p:nvSpPr>
         <p:spPr>
           <a:xfrm>
-            <a:off x="9436316" y="1128440"/>
-            <a:ext cx="946302" cy="350085"/>
+            <a:off x="2138365" y="3525988"/>
+            <a:ext cx="1254278" cy="270935"/>
           </a:xfrm>
           <a:prstGeom prst="rect">
             <a:avLst/>
@@ -9015,17 +9015,17 @@
                   <a:schemeClr val="tx1"/>
                 </a:solidFill>
               </a:rPr>
-              <a:t>Exit</a:t>
-            </a:r>
-          </a:p>
-        </p:txBody>
-      </p:sp>
-      <p:sp>
-        <p:nvSpPr>
-          <p:cNvPr id="16" name="Rectangle 15">
-            <a:extLst>
-              <a:ext uri="{FF2B5EF4-FFF2-40B4-BE49-F238E27FC236}">
-                <a16:creationId xmlns:a16="http://schemas.microsoft.com/office/drawing/2014/main" id="{AA72283E-101D-44F1-97FA-38DEB1489EC0}"/>
+              <a:t>Passenger</a:t>
+            </a:r>
+          </a:p>
+        </p:txBody>
+      </p:sp>
+      <p:sp>
+        <p:nvSpPr>
+          <p:cNvPr id="17" name="Rectangle 16">
+            <a:extLst>
+              <a:ext uri="{FF2B5EF4-FFF2-40B4-BE49-F238E27FC236}">
+                <a16:creationId xmlns:a16="http://schemas.microsoft.com/office/drawing/2014/main" id="{E7229BE9-416F-41CE-A44D-1FF05D0470FD}"/>
               </a:ext>
             </a:extLst>
           </p:cNvPr>
@@ -9034,8 +9034,8 @@
         </p:nvSpPr>
         <p:spPr>
           <a:xfrm>
-            <a:off x="2138365" y="2279914"/>
-            <a:ext cx="1254278" cy="270935"/>
+            <a:off x="3581991" y="3486414"/>
+            <a:ext cx="1254278" cy="350085"/>
           </a:xfrm>
           <a:prstGeom prst="rect">
             <a:avLst/>
@@ -9074,17 +9074,17 @@
                   <a:schemeClr val="tx1"/>
                 </a:solidFill>
               </a:rPr>
-              <a:t>Passenger</a:t>
-            </a:r>
-          </a:p>
-        </p:txBody>
-      </p:sp>
-      <p:sp>
-        <p:nvSpPr>
-          <p:cNvPr id="17" name="Rectangle 16">
-            <a:extLst>
-              <a:ext uri="{FF2B5EF4-FFF2-40B4-BE49-F238E27FC236}">
-                <a16:creationId xmlns:a16="http://schemas.microsoft.com/office/drawing/2014/main" id="{E7229BE9-416F-41CE-A44D-1FF05D0470FD}"/>
+              <a:t>Move through exit</a:t>
+            </a:r>
+          </a:p>
+        </p:txBody>
+      </p:sp>
+      <p:sp>
+        <p:nvSpPr>
+          <p:cNvPr id="18" name="Rectangle 17">
+            <a:extLst>
+              <a:ext uri="{FF2B5EF4-FFF2-40B4-BE49-F238E27FC236}">
+                <a16:creationId xmlns:a16="http://schemas.microsoft.com/office/drawing/2014/main" id="{60FE51CA-D7DB-47B9-BEAB-113B87576599}"/>
               </a:ext>
             </a:extLst>
           </p:cNvPr>
@@ -9093,7 +9093,7 @@
         </p:nvSpPr>
         <p:spPr>
           <a:xfrm>
-            <a:off x="3581991" y="2240340"/>
+            <a:off x="6558796" y="3769691"/>
             <a:ext cx="1254278" cy="350085"/>
           </a:xfrm>
           <a:prstGeom prst="rect">
@@ -9133,17 +9133,17 @@
                   <a:schemeClr val="tx1"/>
                 </a:solidFill>
               </a:rPr>
-              <a:t>Move through exit</a:t>
-            </a:r>
-          </a:p>
-        </p:txBody>
-      </p:sp>
-      <p:sp>
-        <p:nvSpPr>
-          <p:cNvPr id="18" name="Rectangle 17">
-            <a:extLst>
-              <a:ext uri="{FF2B5EF4-FFF2-40B4-BE49-F238E27FC236}">
-                <a16:creationId xmlns:a16="http://schemas.microsoft.com/office/drawing/2014/main" id="{60FE51CA-D7DB-47B9-BEAB-113B87576599}"/>
+              <a:t>Board escalator</a:t>
+            </a:r>
+          </a:p>
+        </p:txBody>
+      </p:sp>
+      <p:sp>
+        <p:nvSpPr>
+          <p:cNvPr id="19" name="Rectangle 18">
+            <a:extLst>
+              <a:ext uri="{FF2B5EF4-FFF2-40B4-BE49-F238E27FC236}">
+                <a16:creationId xmlns:a16="http://schemas.microsoft.com/office/drawing/2014/main" id="{491BD4E5-84C7-4974-A601-1590F26F5F77}"/>
               </a:ext>
             </a:extLst>
           </p:cNvPr>
@@ -9152,7 +9152,7 @@
         </p:nvSpPr>
         <p:spPr>
           <a:xfrm>
-            <a:off x="5038606" y="2240338"/>
+            <a:off x="3590458" y="4476559"/>
             <a:ext cx="1254278" cy="350085"/>
           </a:xfrm>
           <a:prstGeom prst="rect">
@@ -9192,17 +9192,17 @@
                   <a:schemeClr val="tx1"/>
                 </a:solidFill>
               </a:rPr>
-              <a:t>Board escalator</a:t>
-            </a:r>
-          </a:p>
-        </p:txBody>
-      </p:sp>
-      <p:sp>
-        <p:nvSpPr>
-          <p:cNvPr id="19" name="Rectangle 18">
-            <a:extLst>
-              <a:ext uri="{FF2B5EF4-FFF2-40B4-BE49-F238E27FC236}">
-                <a16:creationId xmlns:a16="http://schemas.microsoft.com/office/drawing/2014/main" id="{491BD4E5-84C7-4974-A601-1590F26F5F77}"/>
+              <a:t>Ride escalator</a:t>
+            </a:r>
+          </a:p>
+        </p:txBody>
+      </p:sp>
+      <p:sp>
+        <p:nvSpPr>
+          <p:cNvPr id="20" name="Rectangle 19">
+            <a:extLst>
+              <a:ext uri="{FF2B5EF4-FFF2-40B4-BE49-F238E27FC236}">
+                <a16:creationId xmlns:a16="http://schemas.microsoft.com/office/drawing/2014/main" id="{FA7D589F-0859-4107-9107-22E7C8CA25A1}"/>
               </a:ext>
             </a:extLst>
           </p:cNvPr>
@@ -9211,7 +9211,7 @@
         </p:nvSpPr>
         <p:spPr>
           <a:xfrm>
-            <a:off x="6487396" y="2240338"/>
+            <a:off x="5039248" y="4476559"/>
             <a:ext cx="1254278" cy="350085"/>
           </a:xfrm>
           <a:prstGeom prst="rect">
@@ -9251,17 +9251,17 @@
                   <a:schemeClr val="tx1"/>
                 </a:solidFill>
               </a:rPr>
-              <a:t>Ride escalator</a:t>
-            </a:r>
-          </a:p>
-        </p:txBody>
-      </p:sp>
-      <p:sp>
-        <p:nvSpPr>
-          <p:cNvPr id="20" name="Rectangle 19">
-            <a:extLst>
-              <a:ext uri="{FF2B5EF4-FFF2-40B4-BE49-F238E27FC236}">
-                <a16:creationId xmlns:a16="http://schemas.microsoft.com/office/drawing/2014/main" id="{FA7D589F-0859-4107-9107-22E7C8CA25A1}"/>
+              <a:t>Offboard Escalator</a:t>
+            </a:r>
+          </a:p>
+        </p:txBody>
+      </p:sp>
+      <p:sp>
+        <p:nvSpPr>
+          <p:cNvPr id="21" name="Rectangle 20">
+            <a:extLst>
+              <a:ext uri="{FF2B5EF4-FFF2-40B4-BE49-F238E27FC236}">
+                <a16:creationId xmlns:a16="http://schemas.microsoft.com/office/drawing/2014/main" id="{662014EA-5FBE-4A1C-8771-78FACB01F7EA}"/>
               </a:ext>
             </a:extLst>
           </p:cNvPr>
@@ -9270,8 +9270,8 @@
         </p:nvSpPr>
         <p:spPr>
           <a:xfrm>
-            <a:off x="7936186" y="2240338"/>
-            <a:ext cx="1254278" cy="350085"/>
+            <a:off x="6558796" y="4476559"/>
+            <a:ext cx="946302" cy="350085"/>
           </a:xfrm>
           <a:prstGeom prst="rect">
             <a:avLst/>
@@ -9310,17 +9310,356 @@
                   <a:schemeClr val="tx1"/>
                 </a:solidFill>
               </a:rPr>
-              <a:t>Offboard Escalator</a:t>
-            </a:r>
-          </a:p>
-        </p:txBody>
-      </p:sp>
-      <p:sp>
-        <p:nvSpPr>
-          <p:cNvPr id="21" name="Rectangle 20">
-            <a:extLst>
-              <a:ext uri="{FF2B5EF4-FFF2-40B4-BE49-F238E27FC236}">
-                <a16:creationId xmlns:a16="http://schemas.microsoft.com/office/drawing/2014/main" id="{662014EA-5FBE-4A1C-8771-78FACB01F7EA}"/>
+              <a:t>enter</a:t>
+            </a:r>
+          </a:p>
+        </p:txBody>
+      </p:sp>
+      <p:cxnSp>
+        <p:nvCxnSpPr>
+          <p:cNvPr id="23" name="Straight Arrow Connector 22">
+            <a:extLst>
+              <a:ext uri="{FF2B5EF4-FFF2-40B4-BE49-F238E27FC236}">
+                <a16:creationId xmlns:a16="http://schemas.microsoft.com/office/drawing/2014/main" id="{65257630-E061-4717-9B51-56E6F45ED0F7}"/>
+              </a:ext>
+            </a:extLst>
+          </p:cNvPr>
+          <p:cNvCxnSpPr>
+            <a:cxnSpLocks/>
+            <a:stCxn id="8" idx="3"/>
+            <a:endCxn id="10" idx="1"/>
+          </p:cNvCxnSpPr>
+          <p:nvPr/>
+        </p:nvCxnSpPr>
+        <p:spPr>
+          <a:xfrm flipV="1">
+            <a:off x="1912108" y="1309382"/>
+            <a:ext cx="234724" cy="3"/>
+          </a:xfrm>
+          <a:prstGeom prst="straightConnector1">
+            <a:avLst/>
+          </a:prstGeom>
+          <a:ln>
+            <a:prstDash val="lgDashDot"/>
+            <a:tailEnd type="triangle"/>
+          </a:ln>
+        </p:spPr>
+        <p:style>
+          <a:lnRef idx="1">
+            <a:schemeClr val="dk1"/>
+          </a:lnRef>
+          <a:fillRef idx="0">
+            <a:schemeClr val="dk1"/>
+          </a:fillRef>
+          <a:effectRef idx="0">
+            <a:schemeClr val="dk1"/>
+          </a:effectRef>
+          <a:fontRef idx="minor">
+            <a:schemeClr val="tx1"/>
+          </a:fontRef>
+        </p:style>
+      </p:cxnSp>
+      <p:cxnSp>
+        <p:nvCxnSpPr>
+          <p:cNvPr id="25" name="Straight Arrow Connector 24">
+            <a:extLst>
+              <a:ext uri="{FF2B5EF4-FFF2-40B4-BE49-F238E27FC236}">
+                <a16:creationId xmlns:a16="http://schemas.microsoft.com/office/drawing/2014/main" id="{CF84D257-2542-44AB-9D9E-72D888B89824}"/>
+              </a:ext>
+            </a:extLst>
+          </p:cNvPr>
+          <p:cNvCxnSpPr>
+            <a:stCxn id="10" idx="3"/>
+            <a:endCxn id="11" idx="1"/>
+          </p:cNvCxnSpPr>
+          <p:nvPr/>
+        </p:nvCxnSpPr>
+        <p:spPr>
+          <a:xfrm>
+            <a:off x="3401110" y="1309382"/>
+            <a:ext cx="189348" cy="1"/>
+          </a:xfrm>
+          <a:prstGeom prst="straightConnector1">
+            <a:avLst/>
+          </a:prstGeom>
+          <a:ln>
+            <a:tailEnd type="triangle"/>
+          </a:ln>
+        </p:spPr>
+        <p:style>
+          <a:lnRef idx="1">
+            <a:schemeClr val="dk1"/>
+          </a:lnRef>
+          <a:fillRef idx="0">
+            <a:schemeClr val="dk1"/>
+          </a:fillRef>
+          <a:effectRef idx="0">
+            <a:schemeClr val="dk1"/>
+          </a:effectRef>
+          <a:fontRef idx="minor">
+            <a:schemeClr val="tx1"/>
+          </a:fontRef>
+        </p:style>
+      </p:cxnSp>
+      <p:cxnSp>
+        <p:nvCxnSpPr>
+          <p:cNvPr id="31" name="Straight Arrow Connector 30">
+            <a:extLst>
+              <a:ext uri="{FF2B5EF4-FFF2-40B4-BE49-F238E27FC236}">
+                <a16:creationId xmlns:a16="http://schemas.microsoft.com/office/drawing/2014/main" id="{9FF5D665-4C68-4E5F-85EF-5A146C2A4C3E}"/>
+              </a:ext>
+            </a:extLst>
+          </p:cNvPr>
+          <p:cNvCxnSpPr>
+            <a:stCxn id="13" idx="3"/>
+          </p:cNvCxnSpPr>
+          <p:nvPr/>
+        </p:nvCxnSpPr>
+        <p:spPr>
+          <a:xfrm flipV="1">
+            <a:off x="4836269" y="2251933"/>
+            <a:ext cx="237385" cy="1"/>
+          </a:xfrm>
+          <a:prstGeom prst="straightConnector1">
+            <a:avLst/>
+          </a:prstGeom>
+          <a:ln>
+            <a:tailEnd type="triangle"/>
+          </a:ln>
+        </p:spPr>
+        <p:style>
+          <a:lnRef idx="1">
+            <a:schemeClr val="dk1"/>
+          </a:lnRef>
+          <a:fillRef idx="0">
+            <a:schemeClr val="dk1"/>
+          </a:fillRef>
+          <a:effectRef idx="0">
+            <a:schemeClr val="dk1"/>
+          </a:effectRef>
+          <a:fontRef idx="minor">
+            <a:schemeClr val="tx1"/>
+          </a:fontRef>
+        </p:style>
+      </p:cxnSp>
+      <p:cxnSp>
+        <p:nvCxnSpPr>
+          <p:cNvPr id="33" name="Straight Arrow Connector 32">
+            <a:extLst>
+              <a:ext uri="{FF2B5EF4-FFF2-40B4-BE49-F238E27FC236}">
+                <a16:creationId xmlns:a16="http://schemas.microsoft.com/office/drawing/2014/main" id="{93F00D3D-AF51-4590-98F6-04036646F30B}"/>
+              </a:ext>
+            </a:extLst>
+          </p:cNvPr>
+          <p:cNvCxnSpPr>
+            <a:stCxn id="14" idx="3"/>
+            <a:endCxn id="15" idx="1"/>
+          </p:cNvCxnSpPr>
+          <p:nvPr/>
+        </p:nvCxnSpPr>
+        <p:spPr>
+          <a:xfrm flipV="1">
+            <a:off x="6285059" y="2246036"/>
+            <a:ext cx="237385" cy="5898"/>
+          </a:xfrm>
+          <a:prstGeom prst="straightConnector1">
+            <a:avLst/>
+          </a:prstGeom>
+          <a:ln>
+            <a:tailEnd type="triangle"/>
+          </a:ln>
+        </p:spPr>
+        <p:style>
+          <a:lnRef idx="1">
+            <a:schemeClr val="dk1"/>
+          </a:lnRef>
+          <a:fillRef idx="0">
+            <a:schemeClr val="dk1"/>
+          </a:fillRef>
+          <a:effectRef idx="0">
+            <a:schemeClr val="dk1"/>
+          </a:effectRef>
+          <a:fontRef idx="minor">
+            <a:schemeClr val="tx1"/>
+          </a:fontRef>
+        </p:style>
+      </p:cxnSp>
+      <p:cxnSp>
+        <p:nvCxnSpPr>
+          <p:cNvPr id="35" name="Straight Arrow Connector 34">
+            <a:extLst>
+              <a:ext uri="{FF2B5EF4-FFF2-40B4-BE49-F238E27FC236}">
+                <a16:creationId xmlns:a16="http://schemas.microsoft.com/office/drawing/2014/main" id="{476A2254-AEEC-48F7-B26F-8F90AC010212}"/>
+              </a:ext>
+            </a:extLst>
+          </p:cNvPr>
+          <p:cNvCxnSpPr>
+            <a:cxnSpLocks/>
+            <a:stCxn id="9" idx="3"/>
+            <a:endCxn id="16" idx="1"/>
+          </p:cNvCxnSpPr>
+          <p:nvPr/>
+        </p:nvCxnSpPr>
+        <p:spPr>
+          <a:xfrm flipV="1">
+            <a:off x="1912108" y="3661456"/>
+            <a:ext cx="226257" cy="3136"/>
+          </a:xfrm>
+          <a:prstGeom prst="straightConnector1">
+            <a:avLst/>
+          </a:prstGeom>
+          <a:ln>
+            <a:prstDash val="lgDashDot"/>
+            <a:tailEnd type="triangle"/>
+          </a:ln>
+        </p:spPr>
+        <p:style>
+          <a:lnRef idx="1">
+            <a:schemeClr val="dk1"/>
+          </a:lnRef>
+          <a:fillRef idx="0">
+            <a:schemeClr val="dk1"/>
+          </a:fillRef>
+          <a:effectRef idx="0">
+            <a:schemeClr val="dk1"/>
+          </a:effectRef>
+          <a:fontRef idx="minor">
+            <a:schemeClr val="tx1"/>
+          </a:fontRef>
+        </p:style>
+      </p:cxnSp>
+      <p:cxnSp>
+        <p:nvCxnSpPr>
+          <p:cNvPr id="38" name="Straight Arrow Connector 37">
+            <a:extLst>
+              <a:ext uri="{FF2B5EF4-FFF2-40B4-BE49-F238E27FC236}">
+                <a16:creationId xmlns:a16="http://schemas.microsoft.com/office/drawing/2014/main" id="{798D4E6B-762B-4CE0-BF73-182422DB4991}"/>
+              </a:ext>
+            </a:extLst>
+          </p:cNvPr>
+          <p:cNvCxnSpPr>
+            <a:stCxn id="16" idx="3"/>
+            <a:endCxn id="17" idx="1"/>
+          </p:cNvCxnSpPr>
+          <p:nvPr/>
+        </p:nvCxnSpPr>
+        <p:spPr>
+          <a:xfrm>
+            <a:off x="3392643" y="3661456"/>
+            <a:ext cx="189348" cy="1"/>
+          </a:xfrm>
+          <a:prstGeom prst="straightConnector1">
+            <a:avLst/>
+          </a:prstGeom>
+          <a:ln>
+            <a:tailEnd type="triangle"/>
+          </a:ln>
+        </p:spPr>
+        <p:style>
+          <a:lnRef idx="1">
+            <a:schemeClr val="dk1"/>
+          </a:lnRef>
+          <a:fillRef idx="0">
+            <a:schemeClr val="dk1"/>
+          </a:fillRef>
+          <a:effectRef idx="0">
+            <a:schemeClr val="dk1"/>
+          </a:effectRef>
+          <a:fontRef idx="minor">
+            <a:schemeClr val="tx1"/>
+          </a:fontRef>
+        </p:style>
+      </p:cxnSp>
+      <p:cxnSp>
+        <p:nvCxnSpPr>
+          <p:cNvPr id="44" name="Straight Arrow Connector 43">
+            <a:extLst>
+              <a:ext uri="{FF2B5EF4-FFF2-40B4-BE49-F238E27FC236}">
+                <a16:creationId xmlns:a16="http://schemas.microsoft.com/office/drawing/2014/main" id="{6A60667F-06B9-449B-B82A-CAD03BECE36A}"/>
+              </a:ext>
+            </a:extLst>
+          </p:cNvPr>
+          <p:cNvCxnSpPr>
+            <a:stCxn id="19" idx="3"/>
+            <a:endCxn id="20" idx="1"/>
+          </p:cNvCxnSpPr>
+          <p:nvPr/>
+        </p:nvCxnSpPr>
+        <p:spPr>
+          <a:xfrm>
+            <a:off x="4844736" y="4651602"/>
+            <a:ext cx="194512" cy="0"/>
+          </a:xfrm>
+          <a:prstGeom prst="straightConnector1">
+            <a:avLst/>
+          </a:prstGeom>
+          <a:ln>
+            <a:tailEnd type="triangle"/>
+          </a:ln>
+        </p:spPr>
+        <p:style>
+          <a:lnRef idx="1">
+            <a:schemeClr val="dk1"/>
+          </a:lnRef>
+          <a:fillRef idx="0">
+            <a:schemeClr val="dk1"/>
+          </a:fillRef>
+          <a:effectRef idx="0">
+            <a:schemeClr val="dk1"/>
+          </a:effectRef>
+          <a:fontRef idx="minor">
+            <a:schemeClr val="tx1"/>
+          </a:fontRef>
+        </p:style>
+      </p:cxnSp>
+      <p:cxnSp>
+        <p:nvCxnSpPr>
+          <p:cNvPr id="46" name="Straight Arrow Connector 45">
+            <a:extLst>
+              <a:ext uri="{FF2B5EF4-FFF2-40B4-BE49-F238E27FC236}">
+                <a16:creationId xmlns:a16="http://schemas.microsoft.com/office/drawing/2014/main" id="{D30C6E11-0D23-4FF1-B696-B33225C8592E}"/>
+              </a:ext>
+            </a:extLst>
+          </p:cNvPr>
+          <p:cNvCxnSpPr>
+            <a:stCxn id="20" idx="3"/>
+            <a:endCxn id="21" idx="1"/>
+          </p:cNvCxnSpPr>
+          <p:nvPr/>
+        </p:nvCxnSpPr>
+        <p:spPr>
+          <a:xfrm>
+            <a:off x="6293526" y="4651602"/>
+            <a:ext cx="265270" cy="0"/>
+          </a:xfrm>
+          <a:prstGeom prst="straightConnector1">
+            <a:avLst/>
+          </a:prstGeom>
+          <a:ln>
+            <a:tailEnd type="triangle"/>
+          </a:ln>
+        </p:spPr>
+        <p:style>
+          <a:lnRef idx="1">
+            <a:schemeClr val="dk1"/>
+          </a:lnRef>
+          <a:fillRef idx="0">
+            <a:schemeClr val="dk1"/>
+          </a:fillRef>
+          <a:effectRef idx="0">
+            <a:schemeClr val="dk1"/>
+          </a:effectRef>
+          <a:fontRef idx="minor">
+            <a:schemeClr val="tx1"/>
+          </a:fontRef>
+        </p:style>
+      </p:cxnSp>
+      <p:sp>
+        <p:nvSpPr>
+          <p:cNvPr id="41" name="Rectangle 40">
+            <a:extLst>
+              <a:ext uri="{FF2B5EF4-FFF2-40B4-BE49-F238E27FC236}">
+                <a16:creationId xmlns:a16="http://schemas.microsoft.com/office/drawing/2014/main" id="{F5FAF567-B16B-4FE0-AB69-E3348C93BC9C}"/>
               </a:ext>
             </a:extLst>
           </p:cNvPr>
@@ -9329,8 +9668,8 @@
         </p:nvSpPr>
         <p:spPr>
           <a:xfrm>
-            <a:off x="9455734" y="2240338"/>
-            <a:ext cx="946302" cy="350085"/>
+            <a:off x="6558796" y="3170734"/>
+            <a:ext cx="1254278" cy="350085"/>
           </a:xfrm>
           <a:prstGeom prst="rect">
             <a:avLst/>
@@ -9369,30 +9708,30 @@
                   <a:schemeClr val="tx1"/>
                 </a:solidFill>
               </a:rPr>
-              <a:t>enter</a:t>
+              <a:t>Wait for space</a:t>
             </a:r>
           </a:p>
         </p:txBody>
       </p:sp>
       <p:cxnSp>
         <p:nvCxnSpPr>
-          <p:cNvPr id="23" name="Straight Arrow Connector 22">
-            <a:extLst>
-              <a:ext uri="{FF2B5EF4-FFF2-40B4-BE49-F238E27FC236}">
-                <a16:creationId xmlns:a16="http://schemas.microsoft.com/office/drawing/2014/main" id="{65257630-E061-4717-9B51-56E6F45ED0F7}"/>
+          <p:cNvPr id="34" name="Straight Arrow Connector 33">
+            <a:extLst>
+              <a:ext uri="{FF2B5EF4-FFF2-40B4-BE49-F238E27FC236}">
+                <a16:creationId xmlns:a16="http://schemas.microsoft.com/office/drawing/2014/main" id="{0F70DE38-9231-47FF-9EA5-61D7F5E051D8}"/>
               </a:ext>
             </a:extLst>
           </p:cNvPr>
           <p:cNvCxnSpPr>
-            <a:stCxn id="8" idx="3"/>
-            <a:endCxn id="10" idx="1"/>
+            <a:stCxn id="17" idx="3"/>
+            <a:endCxn id="41" idx="1"/>
           </p:cNvCxnSpPr>
           <p:nvPr/>
         </p:nvCxnSpPr>
         <p:spPr>
           <a:xfrm flipV="1">
-            <a:off x="1912108" y="1309382"/>
-            <a:ext cx="234724" cy="3"/>
+            <a:off x="4836269" y="3345777"/>
+            <a:ext cx="1722527" cy="315680"/>
           </a:xfrm>
           <a:prstGeom prst="straightConnector1">
             <a:avLst/>
@@ -9418,302 +9757,10 @@
       </p:cxnSp>
       <p:cxnSp>
         <p:nvCxnSpPr>
-          <p:cNvPr id="25" name="Straight Arrow Connector 24">
-            <a:extLst>
-              <a:ext uri="{FF2B5EF4-FFF2-40B4-BE49-F238E27FC236}">
-                <a16:creationId xmlns:a16="http://schemas.microsoft.com/office/drawing/2014/main" id="{CF84D257-2542-44AB-9D9E-72D888B89824}"/>
-              </a:ext>
-            </a:extLst>
-          </p:cNvPr>
-          <p:cNvCxnSpPr>
-            <a:stCxn id="10" idx="3"/>
-            <a:endCxn id="11" idx="1"/>
-          </p:cNvCxnSpPr>
-          <p:nvPr/>
-        </p:nvCxnSpPr>
-        <p:spPr>
-          <a:xfrm>
-            <a:off x="3401110" y="1309382"/>
-            <a:ext cx="189348" cy="1"/>
-          </a:xfrm>
-          <a:prstGeom prst="straightConnector1">
-            <a:avLst/>
-          </a:prstGeom>
-          <a:ln>
-            <a:tailEnd type="triangle"/>
-          </a:ln>
-        </p:spPr>
-        <p:style>
-          <a:lnRef idx="1">
-            <a:schemeClr val="dk1"/>
-          </a:lnRef>
-          <a:fillRef idx="0">
-            <a:schemeClr val="dk1"/>
-          </a:fillRef>
-          <a:effectRef idx="0">
-            <a:schemeClr val="dk1"/>
-          </a:effectRef>
-          <a:fontRef idx="minor">
-            <a:schemeClr val="tx1"/>
-          </a:fontRef>
-        </p:style>
-      </p:cxnSp>
-      <p:cxnSp>
-        <p:nvCxnSpPr>
-          <p:cNvPr id="27" name="Straight Arrow Connector 26">
-            <a:extLst>
-              <a:ext uri="{FF2B5EF4-FFF2-40B4-BE49-F238E27FC236}">
-                <a16:creationId xmlns:a16="http://schemas.microsoft.com/office/drawing/2014/main" id="{903CAAC8-B363-4877-8372-5B32CC40EE64}"/>
-              </a:ext>
-            </a:extLst>
-          </p:cNvPr>
-          <p:cNvCxnSpPr>
-            <a:stCxn id="11" idx="3"/>
-            <a:endCxn id="12" idx="1"/>
-          </p:cNvCxnSpPr>
-          <p:nvPr/>
-        </p:nvCxnSpPr>
-        <p:spPr>
-          <a:xfrm flipV="1">
-            <a:off x="4844736" y="1309381"/>
-            <a:ext cx="202337" cy="2"/>
-          </a:xfrm>
-          <a:prstGeom prst="straightConnector1">
-            <a:avLst/>
-          </a:prstGeom>
-          <a:ln>
-            <a:tailEnd type="triangle"/>
-          </a:ln>
-        </p:spPr>
-        <p:style>
-          <a:lnRef idx="1">
-            <a:schemeClr val="dk1"/>
-          </a:lnRef>
-          <a:fillRef idx="0">
-            <a:schemeClr val="dk1"/>
-          </a:fillRef>
-          <a:effectRef idx="0">
-            <a:schemeClr val="dk1"/>
-          </a:effectRef>
-          <a:fontRef idx="minor">
-            <a:schemeClr val="tx1"/>
-          </a:fontRef>
-        </p:style>
-      </p:cxnSp>
-      <p:cxnSp>
-        <p:nvCxnSpPr>
-          <p:cNvPr id="29" name="Straight Arrow Connector 28">
-            <a:extLst>
-              <a:ext uri="{FF2B5EF4-FFF2-40B4-BE49-F238E27FC236}">
-                <a16:creationId xmlns:a16="http://schemas.microsoft.com/office/drawing/2014/main" id="{904CE1D2-CB0C-4D43-B4B1-030DD91CC13A}"/>
-              </a:ext>
-            </a:extLst>
-          </p:cNvPr>
-          <p:cNvCxnSpPr>
-            <a:stCxn id="12" idx="3"/>
-          </p:cNvCxnSpPr>
-          <p:nvPr/>
-        </p:nvCxnSpPr>
-        <p:spPr>
-          <a:xfrm>
-            <a:off x="6301351" y="1309381"/>
-            <a:ext cx="229560" cy="1"/>
-          </a:xfrm>
-          <a:prstGeom prst="straightConnector1">
-            <a:avLst/>
-          </a:prstGeom>
-          <a:ln>
-            <a:tailEnd type="triangle"/>
-          </a:ln>
-        </p:spPr>
-        <p:style>
-          <a:lnRef idx="1">
-            <a:schemeClr val="dk1"/>
-          </a:lnRef>
-          <a:fillRef idx="0">
-            <a:schemeClr val="dk1"/>
-          </a:fillRef>
-          <a:effectRef idx="0">
-            <a:schemeClr val="dk1"/>
-          </a:effectRef>
-          <a:fontRef idx="minor">
-            <a:schemeClr val="tx1"/>
-          </a:fontRef>
-        </p:style>
-      </p:cxnSp>
-      <p:cxnSp>
-        <p:nvCxnSpPr>
-          <p:cNvPr id="31" name="Straight Arrow Connector 30">
-            <a:extLst>
-              <a:ext uri="{FF2B5EF4-FFF2-40B4-BE49-F238E27FC236}">
-                <a16:creationId xmlns:a16="http://schemas.microsoft.com/office/drawing/2014/main" id="{9FF5D665-4C68-4E5F-85EF-5A146C2A4C3E}"/>
-              </a:ext>
-            </a:extLst>
-          </p:cNvPr>
-          <p:cNvCxnSpPr>
-            <a:stCxn id="13" idx="3"/>
-          </p:cNvCxnSpPr>
-          <p:nvPr/>
-        </p:nvCxnSpPr>
-        <p:spPr>
-          <a:xfrm flipV="1">
-            <a:off x="7750141" y="1309380"/>
-            <a:ext cx="237385" cy="1"/>
-          </a:xfrm>
-          <a:prstGeom prst="straightConnector1">
-            <a:avLst/>
-          </a:prstGeom>
-          <a:ln>
-            <a:tailEnd type="triangle"/>
-          </a:ln>
-        </p:spPr>
-        <p:style>
-          <a:lnRef idx="1">
-            <a:schemeClr val="dk1"/>
-          </a:lnRef>
-          <a:fillRef idx="0">
-            <a:schemeClr val="dk1"/>
-          </a:fillRef>
-          <a:effectRef idx="0">
-            <a:schemeClr val="dk1"/>
-          </a:effectRef>
-          <a:fontRef idx="minor">
-            <a:schemeClr val="tx1"/>
-          </a:fontRef>
-        </p:style>
-      </p:cxnSp>
-      <p:cxnSp>
-        <p:nvCxnSpPr>
-          <p:cNvPr id="33" name="Straight Arrow Connector 32">
-            <a:extLst>
-              <a:ext uri="{FF2B5EF4-FFF2-40B4-BE49-F238E27FC236}">
-                <a16:creationId xmlns:a16="http://schemas.microsoft.com/office/drawing/2014/main" id="{93F00D3D-AF51-4590-98F6-04036646F30B}"/>
-              </a:ext>
-            </a:extLst>
-          </p:cNvPr>
-          <p:cNvCxnSpPr>
-            <a:stCxn id="14" idx="3"/>
-            <a:endCxn id="15" idx="1"/>
-          </p:cNvCxnSpPr>
-          <p:nvPr/>
-        </p:nvCxnSpPr>
-        <p:spPr>
-          <a:xfrm flipV="1">
-            <a:off x="9198931" y="1303483"/>
-            <a:ext cx="237385" cy="5898"/>
-          </a:xfrm>
-          <a:prstGeom prst="straightConnector1">
-            <a:avLst/>
-          </a:prstGeom>
-          <a:ln>
-            <a:tailEnd type="triangle"/>
-          </a:ln>
-        </p:spPr>
-        <p:style>
-          <a:lnRef idx="1">
-            <a:schemeClr val="dk1"/>
-          </a:lnRef>
-          <a:fillRef idx="0">
-            <a:schemeClr val="dk1"/>
-          </a:fillRef>
-          <a:effectRef idx="0">
-            <a:schemeClr val="dk1"/>
-          </a:effectRef>
-          <a:fontRef idx="minor">
-            <a:schemeClr val="tx1"/>
-          </a:fontRef>
-        </p:style>
-      </p:cxnSp>
-      <p:cxnSp>
-        <p:nvCxnSpPr>
-          <p:cNvPr id="35" name="Straight Arrow Connector 34">
-            <a:extLst>
-              <a:ext uri="{FF2B5EF4-FFF2-40B4-BE49-F238E27FC236}">
-                <a16:creationId xmlns:a16="http://schemas.microsoft.com/office/drawing/2014/main" id="{476A2254-AEEC-48F7-B26F-8F90AC010212}"/>
-              </a:ext>
-            </a:extLst>
-          </p:cNvPr>
-          <p:cNvCxnSpPr>
-            <a:stCxn id="9" idx="3"/>
-            <a:endCxn id="16" idx="1"/>
-          </p:cNvCxnSpPr>
-          <p:nvPr/>
-        </p:nvCxnSpPr>
-        <p:spPr>
-          <a:xfrm flipV="1">
-            <a:off x="1912108" y="2415382"/>
-            <a:ext cx="226257" cy="3136"/>
-          </a:xfrm>
-          <a:prstGeom prst="straightConnector1">
-            <a:avLst/>
-          </a:prstGeom>
-          <a:ln>
-            <a:tailEnd type="triangle"/>
-          </a:ln>
-        </p:spPr>
-        <p:style>
-          <a:lnRef idx="1">
-            <a:schemeClr val="dk1"/>
-          </a:lnRef>
-          <a:fillRef idx="0">
-            <a:schemeClr val="dk1"/>
-          </a:fillRef>
-          <a:effectRef idx="0">
-            <a:schemeClr val="dk1"/>
-          </a:effectRef>
-          <a:fontRef idx="minor">
-            <a:schemeClr val="tx1"/>
-          </a:fontRef>
-        </p:style>
-      </p:cxnSp>
-      <p:cxnSp>
-        <p:nvCxnSpPr>
-          <p:cNvPr id="38" name="Straight Arrow Connector 37">
-            <a:extLst>
-              <a:ext uri="{FF2B5EF4-FFF2-40B4-BE49-F238E27FC236}">
-                <a16:creationId xmlns:a16="http://schemas.microsoft.com/office/drawing/2014/main" id="{798D4E6B-762B-4CE0-BF73-182422DB4991}"/>
-              </a:ext>
-            </a:extLst>
-          </p:cNvPr>
-          <p:cNvCxnSpPr>
-            <a:stCxn id="16" idx="3"/>
-            <a:endCxn id="17" idx="1"/>
-          </p:cNvCxnSpPr>
-          <p:nvPr/>
-        </p:nvCxnSpPr>
-        <p:spPr>
-          <a:xfrm>
-            <a:off x="3392643" y="2415382"/>
-            <a:ext cx="189348" cy="1"/>
-          </a:xfrm>
-          <a:prstGeom prst="straightConnector1">
-            <a:avLst/>
-          </a:prstGeom>
-          <a:ln>
-            <a:tailEnd type="triangle"/>
-          </a:ln>
-        </p:spPr>
-        <p:style>
-          <a:lnRef idx="1">
-            <a:schemeClr val="dk1"/>
-          </a:lnRef>
-          <a:fillRef idx="0">
-            <a:schemeClr val="dk1"/>
-          </a:fillRef>
-          <a:effectRef idx="0">
-            <a:schemeClr val="dk1"/>
-          </a:effectRef>
-          <a:fontRef idx="minor">
-            <a:schemeClr val="tx1"/>
-          </a:fontRef>
-        </p:style>
-      </p:cxnSp>
-      <p:cxnSp>
-        <p:nvCxnSpPr>
-          <p:cNvPr id="40" name="Straight Arrow Connector 39">
-            <a:extLst>
-              <a:ext uri="{FF2B5EF4-FFF2-40B4-BE49-F238E27FC236}">
-                <a16:creationId xmlns:a16="http://schemas.microsoft.com/office/drawing/2014/main" id="{C8C85453-E59C-4DC1-8C27-FDFF9ED81EA1}"/>
+          <p:cNvPr id="37" name="Straight Arrow Connector 36">
+            <a:extLst>
+              <a:ext uri="{FF2B5EF4-FFF2-40B4-BE49-F238E27FC236}">
+                <a16:creationId xmlns:a16="http://schemas.microsoft.com/office/drawing/2014/main" id="{EB0B9DAE-D948-4EF7-AA84-567183887930}"/>
               </a:ext>
             </a:extLst>
           </p:cNvPr>
@@ -9724,9 +9771,238 @@
           <p:nvPr/>
         </p:nvCxnSpPr>
         <p:spPr>
+          <a:xfrm>
+            <a:off x="4836269" y="3661457"/>
+            <a:ext cx="1722527" cy="283277"/>
+          </a:xfrm>
+          <a:prstGeom prst="straightConnector1">
+            <a:avLst/>
+          </a:prstGeom>
+          <a:ln>
+            <a:tailEnd type="triangle"/>
+          </a:ln>
+        </p:spPr>
+        <p:style>
+          <a:lnRef idx="1">
+            <a:schemeClr val="dk1"/>
+          </a:lnRef>
+          <a:fillRef idx="0">
+            <a:schemeClr val="dk1"/>
+          </a:fillRef>
+          <a:effectRef idx="0">
+            <a:schemeClr val="dk1"/>
+          </a:effectRef>
+          <a:fontRef idx="minor">
+            <a:schemeClr val="tx1"/>
+          </a:fontRef>
+        </p:style>
+      </p:cxnSp>
+      <p:sp>
+        <p:nvSpPr>
+          <p:cNvPr id="47" name="TextBox 46">
+            <a:extLst>
+              <a:ext uri="{FF2B5EF4-FFF2-40B4-BE49-F238E27FC236}">
+                <a16:creationId xmlns:a16="http://schemas.microsoft.com/office/drawing/2014/main" id="{15AD53B7-F611-427C-A91F-A7B462B03B60}"/>
+              </a:ext>
+            </a:extLst>
+          </p:cNvPr>
+          <p:cNvSpPr txBox="1"/>
+          <p:nvPr/>
+        </p:nvSpPr>
+        <p:spPr>
+          <a:xfrm rot="548518">
+            <a:off x="5203760" y="3806044"/>
+            <a:ext cx="925253" cy="230832"/>
+          </a:xfrm>
+          <a:prstGeom prst="rect">
+            <a:avLst/>
+          </a:prstGeom>
+          <a:noFill/>
+        </p:spPr>
+        <p:txBody>
+          <a:bodyPr wrap="none" rtlCol="0">
+            <a:spAutoFit/>
+          </a:bodyPr>
+          <a:lstStyle/>
+          <a:p>
+            <a:r>
+              <a:rPr lang="en-US" sz="900" b="1" dirty="0"/>
+              <a:t>Space available</a:t>
+            </a:r>
+          </a:p>
+        </p:txBody>
+      </p:sp>
+      <p:sp>
+        <p:nvSpPr>
+          <p:cNvPr id="48" name="TextBox 47">
+            <a:extLst>
+              <a:ext uri="{FF2B5EF4-FFF2-40B4-BE49-F238E27FC236}">
+                <a16:creationId xmlns:a16="http://schemas.microsoft.com/office/drawing/2014/main" id="{45BC6B9F-DB02-4C20-B324-BA25F832008B}"/>
+              </a:ext>
+            </a:extLst>
+          </p:cNvPr>
+          <p:cNvSpPr txBox="1"/>
+          <p:nvPr/>
+        </p:nvSpPr>
+        <p:spPr>
+          <a:xfrm rot="20964480">
+            <a:off x="5138370" y="3271100"/>
+            <a:ext cx="1050288" cy="230832"/>
+          </a:xfrm>
+          <a:prstGeom prst="rect">
+            <a:avLst/>
+          </a:prstGeom>
+          <a:noFill/>
+        </p:spPr>
+        <p:txBody>
+          <a:bodyPr wrap="none" rtlCol="0">
+            <a:spAutoFit/>
+          </a:bodyPr>
+          <a:lstStyle/>
+          <a:p>
+            <a:r>
+              <a:rPr lang="en-US" sz="900" b="1" dirty="0"/>
+              <a:t>Space unavailable</a:t>
+            </a:r>
+          </a:p>
+        </p:txBody>
+      </p:sp>
+      <p:sp>
+        <p:nvSpPr>
+          <p:cNvPr id="49" name="Rectangle 48">
+            <a:extLst>
+              <a:ext uri="{FF2B5EF4-FFF2-40B4-BE49-F238E27FC236}">
+                <a16:creationId xmlns:a16="http://schemas.microsoft.com/office/drawing/2014/main" id="{A8877239-BE05-443F-B06C-31E414438B33}"/>
+              </a:ext>
+            </a:extLst>
+          </p:cNvPr>
+          <p:cNvSpPr/>
+          <p:nvPr/>
+        </p:nvSpPr>
+        <p:spPr>
+          <a:xfrm>
+            <a:off x="6567263" y="1418664"/>
+            <a:ext cx="1254278" cy="350085"/>
+          </a:xfrm>
+          <a:prstGeom prst="rect">
+            <a:avLst/>
+          </a:prstGeom>
+          <a:noFill/>
+          <a:ln>
+            <a:solidFill>
+              <a:schemeClr val="tx1"/>
+            </a:solidFill>
+          </a:ln>
+        </p:spPr>
+        <p:style>
+          <a:lnRef idx="2">
+            <a:schemeClr val="accent1">
+              <a:shade val="50000"/>
+            </a:schemeClr>
+          </a:lnRef>
+          <a:fillRef idx="1">
+            <a:schemeClr val="accent1"/>
+          </a:fillRef>
+          <a:effectRef idx="0">
+            <a:schemeClr val="accent1"/>
+          </a:effectRef>
+          <a:fontRef idx="minor">
+            <a:schemeClr val="lt1"/>
+          </a:fontRef>
+        </p:style>
+        <p:txBody>
+          <a:bodyPr rtlCol="0" anchor="ctr"/>
+          <a:lstStyle/>
+          <a:p>
+            <a:pPr algn="ctr"/>
+            <a:r>
+              <a:rPr lang="en-US" sz="900" b="1" dirty="0">
+                <a:solidFill>
+                  <a:schemeClr val="tx1"/>
+                </a:solidFill>
+              </a:rPr>
+              <a:t>Board escalator</a:t>
+            </a:r>
+          </a:p>
+        </p:txBody>
+      </p:sp>
+      <p:sp>
+        <p:nvSpPr>
+          <p:cNvPr id="50" name="Rectangle 49">
+            <a:extLst>
+              <a:ext uri="{FF2B5EF4-FFF2-40B4-BE49-F238E27FC236}">
+                <a16:creationId xmlns:a16="http://schemas.microsoft.com/office/drawing/2014/main" id="{BC998AF3-B612-4DE2-A829-62ADC53DF70E}"/>
+              </a:ext>
+            </a:extLst>
+          </p:cNvPr>
+          <p:cNvSpPr/>
+          <p:nvPr/>
+        </p:nvSpPr>
+        <p:spPr>
+          <a:xfrm>
+            <a:off x="6567263" y="819707"/>
+            <a:ext cx="1254278" cy="350085"/>
+          </a:xfrm>
+          <a:prstGeom prst="rect">
+            <a:avLst/>
+          </a:prstGeom>
+          <a:noFill/>
+          <a:ln>
+            <a:solidFill>
+              <a:schemeClr val="tx1"/>
+            </a:solidFill>
+          </a:ln>
+        </p:spPr>
+        <p:style>
+          <a:lnRef idx="2">
+            <a:schemeClr val="accent1">
+              <a:shade val="50000"/>
+            </a:schemeClr>
+          </a:lnRef>
+          <a:fillRef idx="1">
+            <a:schemeClr val="accent1"/>
+          </a:fillRef>
+          <a:effectRef idx="0">
+            <a:schemeClr val="accent1"/>
+          </a:effectRef>
+          <a:fontRef idx="minor">
+            <a:schemeClr val="lt1"/>
+          </a:fontRef>
+        </p:style>
+        <p:txBody>
+          <a:bodyPr rtlCol="0" anchor="ctr"/>
+          <a:lstStyle/>
+          <a:p>
+            <a:pPr algn="ctr"/>
+            <a:r>
+              <a:rPr lang="en-US" sz="900" b="1" dirty="0">
+                <a:solidFill>
+                  <a:schemeClr val="tx1"/>
+                </a:solidFill>
+              </a:rPr>
+              <a:t>Wait for space</a:t>
+            </a:r>
+          </a:p>
+        </p:txBody>
+      </p:sp>
+      <p:cxnSp>
+        <p:nvCxnSpPr>
+          <p:cNvPr id="51" name="Straight Arrow Connector 50">
+            <a:extLst>
+              <a:ext uri="{FF2B5EF4-FFF2-40B4-BE49-F238E27FC236}">
+                <a16:creationId xmlns:a16="http://schemas.microsoft.com/office/drawing/2014/main" id="{D88702F8-8ACF-4F3B-BF00-2858BB0C981E}"/>
+              </a:ext>
+            </a:extLst>
+          </p:cNvPr>
+          <p:cNvCxnSpPr>
+            <a:endCxn id="50" idx="1"/>
+          </p:cNvCxnSpPr>
+          <p:nvPr/>
+        </p:nvCxnSpPr>
+        <p:spPr>
           <a:xfrm flipV="1">
-            <a:off x="4836269" y="2415381"/>
-            <a:ext cx="202337" cy="2"/>
+            <a:off x="4844736" y="994750"/>
+            <a:ext cx="1722527" cy="315680"/>
           </a:xfrm>
           <a:prstGeom prst="straightConnector1">
             <a:avLst/>
@@ -9752,10 +10028,167 @@
       </p:cxnSp>
       <p:cxnSp>
         <p:nvCxnSpPr>
-          <p:cNvPr id="42" name="Straight Arrow Connector 41">
-            <a:extLst>
-              <a:ext uri="{FF2B5EF4-FFF2-40B4-BE49-F238E27FC236}">
-                <a16:creationId xmlns:a16="http://schemas.microsoft.com/office/drawing/2014/main" id="{5370D3B0-4870-4383-B4BB-09B18D19A53E}"/>
+          <p:cNvPr id="52" name="Straight Arrow Connector 51">
+            <a:extLst>
+              <a:ext uri="{FF2B5EF4-FFF2-40B4-BE49-F238E27FC236}">
+                <a16:creationId xmlns:a16="http://schemas.microsoft.com/office/drawing/2014/main" id="{D86EF00D-B79B-4399-8C31-B5CFA08671A6}"/>
+              </a:ext>
+            </a:extLst>
+          </p:cNvPr>
+          <p:cNvCxnSpPr>
+            <a:endCxn id="49" idx="1"/>
+          </p:cNvCxnSpPr>
+          <p:nvPr/>
+        </p:nvCxnSpPr>
+        <p:spPr>
+          <a:xfrm>
+            <a:off x="4844736" y="1310430"/>
+            <a:ext cx="1722527" cy="283277"/>
+          </a:xfrm>
+          <a:prstGeom prst="straightConnector1">
+            <a:avLst/>
+          </a:prstGeom>
+          <a:ln>
+            <a:tailEnd type="triangle"/>
+          </a:ln>
+        </p:spPr>
+        <p:style>
+          <a:lnRef idx="1">
+            <a:schemeClr val="dk1"/>
+          </a:lnRef>
+          <a:fillRef idx="0">
+            <a:schemeClr val="dk1"/>
+          </a:fillRef>
+          <a:effectRef idx="0">
+            <a:schemeClr val="dk1"/>
+          </a:effectRef>
+          <a:fontRef idx="minor">
+            <a:schemeClr val="tx1"/>
+          </a:fontRef>
+        </p:style>
+      </p:cxnSp>
+      <p:sp>
+        <p:nvSpPr>
+          <p:cNvPr id="53" name="TextBox 52">
+            <a:extLst>
+              <a:ext uri="{FF2B5EF4-FFF2-40B4-BE49-F238E27FC236}">
+                <a16:creationId xmlns:a16="http://schemas.microsoft.com/office/drawing/2014/main" id="{AA55B2AA-A57F-43FE-AAEA-E0F3277C688F}"/>
+              </a:ext>
+            </a:extLst>
+          </p:cNvPr>
+          <p:cNvSpPr txBox="1"/>
+          <p:nvPr/>
+        </p:nvSpPr>
+        <p:spPr>
+          <a:xfrm rot="548518">
+            <a:off x="5212227" y="1455017"/>
+            <a:ext cx="925253" cy="230832"/>
+          </a:xfrm>
+          <a:prstGeom prst="rect">
+            <a:avLst/>
+          </a:prstGeom>
+          <a:noFill/>
+        </p:spPr>
+        <p:txBody>
+          <a:bodyPr wrap="none" rtlCol="0">
+            <a:spAutoFit/>
+          </a:bodyPr>
+          <a:lstStyle/>
+          <a:p>
+            <a:r>
+              <a:rPr lang="en-US" sz="900" b="1" dirty="0"/>
+              <a:t>Space available</a:t>
+            </a:r>
+          </a:p>
+        </p:txBody>
+      </p:sp>
+      <p:sp>
+        <p:nvSpPr>
+          <p:cNvPr id="54" name="TextBox 53">
+            <a:extLst>
+              <a:ext uri="{FF2B5EF4-FFF2-40B4-BE49-F238E27FC236}">
+                <a16:creationId xmlns:a16="http://schemas.microsoft.com/office/drawing/2014/main" id="{DE46B9DB-5DAC-4082-ABAA-1E435E0AA5AB}"/>
+              </a:ext>
+            </a:extLst>
+          </p:cNvPr>
+          <p:cNvSpPr txBox="1"/>
+          <p:nvPr/>
+        </p:nvSpPr>
+        <p:spPr>
+          <a:xfrm rot="20964480">
+            <a:off x="5146837" y="920073"/>
+            <a:ext cx="1050288" cy="230832"/>
+          </a:xfrm>
+          <a:prstGeom prst="rect">
+            <a:avLst/>
+          </a:prstGeom>
+          <a:noFill/>
+        </p:spPr>
+        <p:txBody>
+          <a:bodyPr wrap="none" rtlCol="0">
+            <a:spAutoFit/>
+          </a:bodyPr>
+          <a:lstStyle/>
+          <a:p>
+            <a:r>
+              <a:rPr lang="en-US" sz="900" b="1" dirty="0"/>
+              <a:t>Space unavailable</a:t>
+            </a:r>
+          </a:p>
+        </p:txBody>
+      </p:sp>
+      <p:cxnSp>
+        <p:nvCxnSpPr>
+          <p:cNvPr id="56" name="Connector: Elbow 55">
+            <a:extLst>
+              <a:ext uri="{FF2B5EF4-FFF2-40B4-BE49-F238E27FC236}">
+                <a16:creationId xmlns:a16="http://schemas.microsoft.com/office/drawing/2014/main" id="{D202C988-60AE-4296-A09F-FE4EA61BE12A}"/>
+              </a:ext>
+            </a:extLst>
+          </p:cNvPr>
+          <p:cNvCxnSpPr>
+            <a:stCxn id="49" idx="3"/>
+            <a:endCxn id="13" idx="1"/>
+          </p:cNvCxnSpPr>
+          <p:nvPr/>
+        </p:nvCxnSpPr>
+        <p:spPr>
+          <a:xfrm flipH="1">
+            <a:off x="3581991" y="1593707"/>
+            <a:ext cx="4239550" cy="658227"/>
+          </a:xfrm>
+          <a:prstGeom prst="bentConnector5">
+            <a:avLst>
+              <a:gd name="adj1" fmla="val -5392"/>
+              <a:gd name="adj2" fmla="val 50000"/>
+              <a:gd name="adj3" fmla="val 105392"/>
+            </a:avLst>
+          </a:prstGeom>
+          <a:ln>
+            <a:tailEnd type="triangle"/>
+          </a:ln>
+        </p:spPr>
+        <p:style>
+          <a:lnRef idx="1">
+            <a:schemeClr val="dk1"/>
+          </a:lnRef>
+          <a:fillRef idx="0">
+            <a:schemeClr val="dk1"/>
+          </a:fillRef>
+          <a:effectRef idx="0">
+            <a:schemeClr val="dk1"/>
+          </a:effectRef>
+          <a:fontRef idx="minor">
+            <a:schemeClr val="tx1"/>
+          </a:fontRef>
+        </p:style>
+      </p:cxnSp>
+      <p:cxnSp>
+        <p:nvCxnSpPr>
+          <p:cNvPr id="58" name="Connector: Elbow 57">
+            <a:extLst>
+              <a:ext uri="{FF2B5EF4-FFF2-40B4-BE49-F238E27FC236}">
+                <a16:creationId xmlns:a16="http://schemas.microsoft.com/office/drawing/2014/main" id="{FE381CFE-9630-426B-8E61-CFC0996F6892}"/>
               </a:ext>
             </a:extLst>
           </p:cNvPr>
@@ -9766,12 +10199,16 @@
           <p:nvPr/>
         </p:nvCxnSpPr>
         <p:spPr>
-          <a:xfrm>
-            <a:off x="6292884" y="2415381"/>
-            <a:ext cx="194512" cy="0"/>
-          </a:xfrm>
-          <a:prstGeom prst="straightConnector1">
-            <a:avLst/>
+          <a:xfrm flipH="1">
+            <a:off x="3590458" y="3944734"/>
+            <a:ext cx="4222616" cy="706868"/>
+          </a:xfrm>
+          <a:prstGeom prst="bentConnector5">
+            <a:avLst>
+              <a:gd name="adj1" fmla="val -5414"/>
+              <a:gd name="adj2" fmla="val 50000"/>
+              <a:gd name="adj3" fmla="val 105414"/>
+            </a:avLst>
           </a:prstGeom>
           <a:ln>
             <a:tailEnd type="triangle"/>
@@ -9794,23 +10231,23 @@
       </p:cxnSp>
       <p:cxnSp>
         <p:nvCxnSpPr>
-          <p:cNvPr id="44" name="Straight Arrow Connector 43">
-            <a:extLst>
-              <a:ext uri="{FF2B5EF4-FFF2-40B4-BE49-F238E27FC236}">
-                <a16:creationId xmlns:a16="http://schemas.microsoft.com/office/drawing/2014/main" id="{6A60667F-06B9-449B-B82A-CAD03BECE36A}"/>
+          <p:cNvPr id="60" name="Straight Arrow Connector 59">
+            <a:extLst>
+              <a:ext uri="{FF2B5EF4-FFF2-40B4-BE49-F238E27FC236}">
+                <a16:creationId xmlns:a16="http://schemas.microsoft.com/office/drawing/2014/main" id="{E5310F61-BB36-40B2-9470-162BF1CABEB3}"/>
               </a:ext>
             </a:extLst>
           </p:cNvPr>
           <p:cNvCxnSpPr>
-            <a:stCxn id="19" idx="3"/>
-            <a:endCxn id="20" idx="1"/>
+            <a:stCxn id="50" idx="2"/>
+            <a:endCxn id="49" idx="0"/>
           </p:cNvCxnSpPr>
           <p:nvPr/>
         </p:nvCxnSpPr>
         <p:spPr>
           <a:xfrm>
-            <a:off x="7741674" y="2415381"/>
-            <a:ext cx="194512" cy="0"/>
+            <a:off x="7194402" y="1169792"/>
+            <a:ext cx="0" cy="248872"/>
           </a:xfrm>
           <a:prstGeom prst="straightConnector1">
             <a:avLst/>
@@ -9836,23 +10273,23 @@
       </p:cxnSp>
       <p:cxnSp>
         <p:nvCxnSpPr>
-          <p:cNvPr id="46" name="Straight Arrow Connector 45">
-            <a:extLst>
-              <a:ext uri="{FF2B5EF4-FFF2-40B4-BE49-F238E27FC236}">
-                <a16:creationId xmlns:a16="http://schemas.microsoft.com/office/drawing/2014/main" id="{D30C6E11-0D23-4FF1-B696-B33225C8592E}"/>
+          <p:cNvPr id="62" name="Straight Arrow Connector 61">
+            <a:extLst>
+              <a:ext uri="{FF2B5EF4-FFF2-40B4-BE49-F238E27FC236}">
+                <a16:creationId xmlns:a16="http://schemas.microsoft.com/office/drawing/2014/main" id="{2BD781C7-958B-41CE-8394-4618B486B109}"/>
               </a:ext>
             </a:extLst>
           </p:cNvPr>
           <p:cNvCxnSpPr>
-            <a:stCxn id="20" idx="3"/>
-            <a:endCxn id="21" idx="1"/>
+            <a:stCxn id="41" idx="2"/>
+            <a:endCxn id="18" idx="0"/>
           </p:cNvCxnSpPr>
           <p:nvPr/>
         </p:nvCxnSpPr>
         <p:spPr>
           <a:xfrm>
-            <a:off x="9190464" y="2415381"/>
-            <a:ext cx="265270" cy="0"/>
+            <a:off x="7185935" y="3520819"/>
+            <a:ext cx="0" cy="248872"/>
           </a:xfrm>
           <a:prstGeom prst="straightConnector1">
             <a:avLst/>

</xml_diff>